<commit_message>
simplified slide 3 and 4
</commit_message>
<xml_diff>
--- a/presentations/slides-118-anima-update-brski-with-pledge-in-responder-mode-brski-prm.pptx
+++ b/presentations/slides-118-anima-update-brski-with-pledge-in-responder-mode-brski-prm.pptx
@@ -236,7 +236,7 @@
           <a:p>
             <a:fld id="{33B5B5E8-CA78-4A82-83A0-867EF5A818AE}" type="datetimeFigureOut">
               <a:rPr lang="en-US" smtClean="0"/>
-              <a:t>10/25/2023</a:t>
+              <a:t>11/2/2023</a:t>
             </a:fld>
             <a:endParaRPr lang="en-US"/>
           </a:p>
@@ -1304,7 +1304,7 @@
           <a:p>
             <a:fld id="{8C792E63-5F21-4F54-A864-D84D9F273FCA}" type="datetimeFigureOut">
               <a:rPr lang="en-US" smtClean="0"/>
-              <a:t>10/25/2023</a:t>
+              <a:t>11/2/2023</a:t>
             </a:fld>
             <a:endParaRPr lang="en-US" dirty="0"/>
           </a:p>
@@ -1522,7 +1522,7 @@
           <a:p>
             <a:fld id="{8C792E63-5F21-4F54-A864-D84D9F273FCA}" type="datetimeFigureOut">
               <a:rPr lang="en-US" smtClean="0"/>
-              <a:t>10/25/2023</a:t>
+              <a:t>11/2/2023</a:t>
             </a:fld>
             <a:endParaRPr lang="en-US"/>
           </a:p>
@@ -1746,7 +1746,7 @@
           <a:p>
             <a:fld id="{8C792E63-5F21-4F54-A864-D84D9F273FCA}" type="datetimeFigureOut">
               <a:rPr lang="en-US" smtClean="0"/>
-              <a:t>10/25/2023</a:t>
+              <a:t>11/2/2023</a:t>
             </a:fld>
             <a:endParaRPr lang="en-US"/>
           </a:p>
@@ -1960,7 +1960,7 @@
           <a:p>
             <a:fld id="{8C792E63-5F21-4F54-A864-D84D9F273FCA}" type="datetimeFigureOut">
               <a:rPr lang="en-US" smtClean="0"/>
-              <a:t>10/25/2023</a:t>
+              <a:t>11/2/2023</a:t>
             </a:fld>
             <a:endParaRPr lang="en-US"/>
           </a:p>
@@ -2251,7 +2251,7 @@
           <a:p>
             <a:fld id="{8C792E63-5F21-4F54-A864-D84D9F273FCA}" type="datetimeFigureOut">
               <a:rPr lang="en-US" smtClean="0"/>
-              <a:t>10/25/2023</a:t>
+              <a:t>11/2/2023</a:t>
             </a:fld>
             <a:endParaRPr lang="en-US"/>
           </a:p>
@@ -2532,7 +2532,7 @@
           <a:p>
             <a:fld id="{8C792E63-5F21-4F54-A864-D84D9F273FCA}" type="datetimeFigureOut">
               <a:rPr lang="en-US" smtClean="0"/>
-              <a:t>10/25/2023</a:t>
+              <a:t>11/2/2023</a:t>
             </a:fld>
             <a:endParaRPr lang="en-US"/>
           </a:p>
@@ -2960,7 +2960,7 @@
           <a:p>
             <a:fld id="{8C792E63-5F21-4F54-A864-D84D9F273FCA}" type="datetimeFigureOut">
               <a:rPr lang="en-US" smtClean="0"/>
-              <a:t>10/25/2023</a:t>
+              <a:t>11/2/2023</a:t>
             </a:fld>
             <a:endParaRPr lang="en-US"/>
           </a:p>
@@ -3117,7 +3117,7 @@
           <a:p>
             <a:fld id="{8C792E63-5F21-4F54-A864-D84D9F273FCA}" type="datetimeFigureOut">
               <a:rPr lang="en-US" smtClean="0"/>
-              <a:t>10/25/2023</a:t>
+              <a:t>11/2/2023</a:t>
             </a:fld>
             <a:endParaRPr lang="en-US"/>
           </a:p>
@@ -3246,7 +3246,7 @@
           <a:p>
             <a:fld id="{8C792E63-5F21-4F54-A864-D84D9F273FCA}" type="datetimeFigureOut">
               <a:rPr lang="en-US" smtClean="0"/>
-              <a:t>10/25/2023</a:t>
+              <a:t>11/2/2023</a:t>
             </a:fld>
             <a:endParaRPr lang="en-US"/>
           </a:p>
@@ -3573,7 +3573,7 @@
           <a:p>
             <a:fld id="{8C792E63-5F21-4F54-A864-D84D9F273FCA}" type="datetimeFigureOut">
               <a:rPr lang="en-US" smtClean="0"/>
-              <a:t>10/25/2023</a:t>
+              <a:t>11/2/2023</a:t>
             </a:fld>
             <a:endParaRPr lang="en-US"/>
           </a:p>
@@ -3877,7 +3877,7 @@
           <a:p>
             <a:fld id="{8C792E63-5F21-4F54-A864-D84D9F273FCA}" type="datetimeFigureOut">
               <a:rPr lang="en-US" smtClean="0"/>
-              <a:t>10/25/2023</a:t>
+              <a:t>11/2/2023</a:t>
             </a:fld>
             <a:endParaRPr lang="en-US"/>
           </a:p>
@@ -4169,7 +4169,7 @@
           <a:p>
             <a:fld id="{8C792E63-5F21-4F54-A864-D84D9F273FCA}" type="datetimeFigureOut">
               <a:rPr lang="en-US" smtClean="0"/>
-              <a:t>10/25/2023</a:t>
+              <a:t>11/2/2023</a:t>
             </a:fld>
             <a:endParaRPr lang="en-US"/>
           </a:p>
@@ -5144,7 +5144,7 @@
             <a:fld id="{8C792E63-5F21-4F54-A864-D84D9F273FCA}" type="datetimeFigureOut">
               <a:rPr lang="en-US" smtClean="0"/>
               <a:pPr/>
-              <a:t>10/25/2023</a:t>
+              <a:t>11/2/2023</a:t>
             </a:fld>
             <a:endParaRPr lang="en-US" dirty="0"/>
           </a:p>
@@ -5392,7 +5392,7 @@
               <a:rPr lang="en-US" sz="2400" dirty="0">
                 <a:sym typeface="Wingdings" panose="05000000000000000000" pitchFamily="2" charset="2"/>
               </a:rPr>
-              <a:t>Discovery between registrar-agent and registrar is not needed as registrar-agent and registrar have a trust relation and are assumed to exchange information like serial numbers of expected pledges to be discovered by the registrar-agent. </a:t>
+              <a:t>Discovery between registrar-agent and registrar is not needed (have trust relation and are assumed to exchange upfront information). </a:t>
             </a:r>
           </a:p>
           <a:p>
@@ -5411,7 +5411,7 @@
               <a:rPr lang="en-US" sz="2400" dirty="0">
                 <a:sym typeface="Wingdings" panose="05000000000000000000" pitchFamily="2" charset="2"/>
               </a:rPr>
-              <a:t>Current discovery in BRSKI does not consider registrars with enhanced feature sets like for BRSKI-PRM. This is handled in </a:t>
+              <a:t>Current discovery in BRSKI does not consider registrars with enhanced feature sets. This is handled in </a:t>
             </a:r>
             <a:r>
               <a:rPr lang="en-US" sz="2400" dirty="0">
@@ -5778,7 +5778,7 @@
             <a:fld id="{8C792E63-5F21-4F54-A864-D84D9F273FCA}" type="datetimeFigureOut">
               <a:rPr lang="en-US" smtClean="0"/>
               <a:pPr/>
-              <a:t>10/25/2023</a:t>
+              <a:t>11/2/2023</a:t>
             </a:fld>
             <a:endParaRPr lang="en-US" dirty="0"/>
           </a:p>
@@ -5917,7 +5917,7 @@
             </a:r>
             <a:r>
               <a:rPr lang="en-US" sz="2000" dirty="0"/>
-              <a:t>", to discover a specific pledge, e.g., when connected to a local network.</a:t>
+              <a:t>", to discover a specific pledge.</a:t>
             </a:r>
           </a:p>
           <a:p>
@@ -5990,7 +5990,7 @@
               <a:rPr lang="en-US" sz="2400" dirty="0">
                 <a:sym typeface="Wingdings" panose="05000000000000000000" pitchFamily="2" charset="2"/>
               </a:rPr>
-              <a:t>-discovery) describes more advanced discovery to not only contain the product serial number, but also further information like the manufacturer. </a:t>
+              <a:t>-discovery) describes more advanced approach to contain additional info (like manufacturer) to product serial number. </a:t>
             </a:r>
           </a:p>
           <a:p>
@@ -6034,39 +6034,29 @@
                 <a:ea typeface="Calibri" panose="020F0502020204030204" pitchFamily="34" charset="0"/>
                 <a:cs typeface="Arial" panose="020B0604020202020204" pitchFamily="34" charset="0"/>
               </a:rPr>
-              <a:t>by using manufacturer-specific product serial numbers only.  While this may result in false positives (every manufacturer has serial number 001 present), the registrar-agent can filter through the results, e.g., based on the related </a:t>
-            </a:r>
-            <a:r>
-              <a:rPr lang="en-US" sz="2400" kern="100" dirty="0" err="1">
-                <a:effectLst/>
-                <a:latin typeface="Calibri" panose="020F0502020204030204" pitchFamily="34" charset="0"/>
-                <a:ea typeface="Calibri" panose="020F0502020204030204" pitchFamily="34" charset="0"/>
-                <a:cs typeface="Arial" panose="020B0604020202020204" pitchFamily="34" charset="0"/>
-              </a:rPr>
+              <a:t>by using manufacturer-specific product serial numbers only.  </a:t>
+            </a:r>
+          </a:p>
+          <a:p>
+            <a:pPr lvl="1">
+              <a:buSzPct val="80000"/>
+            </a:pPr>
+            <a:r>
+              <a:rPr lang="en-US" sz="2000" dirty="0"/>
+              <a:t>While this may result in false positives (every manufacturer has serial number 001 present), the registrar-agent can filter through the results, e.g., based on the related </a:t>
+            </a:r>
+            <a:r>
+              <a:rPr lang="en-US" sz="2000" dirty="0" err="1"/>
               <a:t>IDevID</a:t>
             </a:r>
             <a:r>
-              <a:rPr lang="en-US" sz="2400" kern="100" dirty="0">
-                <a:effectLst/>
-                <a:latin typeface="Calibri" panose="020F0502020204030204" pitchFamily="34" charset="0"/>
-                <a:ea typeface="Calibri" panose="020F0502020204030204" pitchFamily="34" charset="0"/>
-                <a:cs typeface="Arial" panose="020B0604020202020204" pitchFamily="34" charset="0"/>
-              </a:rPr>
-              <a:t> CA certificate.</a:t>
-            </a:r>
-          </a:p>
-          <a:p>
-            <a:pPr>
-              <a:lnSpc>
-                <a:spcPct val="100000"/>
-              </a:lnSpc>
-              <a:spcBef>
-                <a:spcPts val="600"/>
-              </a:spcBef>
-              <a:buSzPct val="80000"/>
-              <a:buFont typeface="Calibri" panose="020F0502020204030204" pitchFamily="34" charset="0"/>
-              <a:buChar char="–"/>
-            </a:pPr>
+              <a:rPr lang="en-US" sz="2000" dirty="0"/>
+              <a:t> CA </a:t>
+            </a:r>
+            <a:r>
+              <a:rPr lang="en-US" sz="2000"/>
+              <a:t>certificate.</a:t>
+            </a:r>
             <a:endParaRPr lang="en-US" sz="2400" dirty="0">
               <a:sym typeface="Wingdings" panose="05000000000000000000" pitchFamily="2" charset="2"/>
             </a:endParaRPr>
@@ -6347,7 +6337,7 @@
             <a:fld id="{8C792E63-5F21-4F54-A864-D84D9F273FCA}" type="datetimeFigureOut">
               <a:rPr lang="en-US" smtClean="0"/>
               <a:pPr/>
-              <a:t>10/25/2023</a:t>
+              <a:t>11/2/2023</a:t>
             </a:fld>
             <a:endParaRPr lang="en-US" dirty="0"/>
           </a:p>
@@ -6872,7 +6862,7 @@
             <a:fld id="{8C792E63-5F21-4F54-A864-D84D9F273FCA}" type="datetimeFigureOut">
               <a:rPr lang="en-US" smtClean="0"/>
               <a:pPr/>
-              <a:t>10/25/2023</a:t>
+              <a:t>11/2/2023</a:t>
             </a:fld>
             <a:endParaRPr lang="en-US" dirty="0"/>
           </a:p>

</xml_diff>

<commit_message>
aligned content with discussion form IETF 118 side meeting
</commit_message>
<xml_diff>
--- a/presentations/slides-118-anima-update-brski-with-pledge-in-responder-mode-brski-prm.pptx
+++ b/presentations/slides-118-anima-update-brski-with-pledge-in-responder-mode-brski-prm.pptx
@@ -236,7 +236,7 @@
           <a:p>
             <a:fld id="{33B5B5E8-CA78-4A82-83A0-867EF5A818AE}" type="datetimeFigureOut">
               <a:rPr lang="en-US" smtClean="0"/>
-              <a:t>11/3/2023</a:t>
+              <a:t>11/7/2023</a:t>
             </a:fld>
             <a:endParaRPr lang="en-US"/>
           </a:p>
@@ -1304,7 +1304,7 @@
           <a:p>
             <a:fld id="{8C792E63-5F21-4F54-A864-D84D9F273FCA}" type="datetimeFigureOut">
               <a:rPr lang="en-US" smtClean="0"/>
-              <a:t>11/3/2023</a:t>
+              <a:t>11/7/2023</a:t>
             </a:fld>
             <a:endParaRPr lang="en-US" dirty="0"/>
           </a:p>
@@ -1522,7 +1522,7 @@
           <a:p>
             <a:fld id="{8C792E63-5F21-4F54-A864-D84D9F273FCA}" type="datetimeFigureOut">
               <a:rPr lang="en-US" smtClean="0"/>
-              <a:t>11/3/2023</a:t>
+              <a:t>11/7/2023</a:t>
             </a:fld>
             <a:endParaRPr lang="en-US"/>
           </a:p>
@@ -1746,7 +1746,7 @@
           <a:p>
             <a:fld id="{8C792E63-5F21-4F54-A864-D84D9F273FCA}" type="datetimeFigureOut">
               <a:rPr lang="en-US" smtClean="0"/>
-              <a:t>11/3/2023</a:t>
+              <a:t>11/7/2023</a:t>
             </a:fld>
             <a:endParaRPr lang="en-US"/>
           </a:p>
@@ -1960,7 +1960,7 @@
           <a:p>
             <a:fld id="{8C792E63-5F21-4F54-A864-D84D9F273FCA}" type="datetimeFigureOut">
               <a:rPr lang="en-US" smtClean="0"/>
-              <a:t>11/3/2023</a:t>
+              <a:t>11/7/2023</a:t>
             </a:fld>
             <a:endParaRPr lang="en-US"/>
           </a:p>
@@ -2251,7 +2251,7 @@
           <a:p>
             <a:fld id="{8C792E63-5F21-4F54-A864-D84D9F273FCA}" type="datetimeFigureOut">
               <a:rPr lang="en-US" smtClean="0"/>
-              <a:t>11/3/2023</a:t>
+              <a:t>11/7/2023</a:t>
             </a:fld>
             <a:endParaRPr lang="en-US"/>
           </a:p>
@@ -2532,7 +2532,7 @@
           <a:p>
             <a:fld id="{8C792E63-5F21-4F54-A864-D84D9F273FCA}" type="datetimeFigureOut">
               <a:rPr lang="en-US" smtClean="0"/>
-              <a:t>11/3/2023</a:t>
+              <a:t>11/7/2023</a:t>
             </a:fld>
             <a:endParaRPr lang="en-US"/>
           </a:p>
@@ -2960,7 +2960,7 @@
           <a:p>
             <a:fld id="{8C792E63-5F21-4F54-A864-D84D9F273FCA}" type="datetimeFigureOut">
               <a:rPr lang="en-US" smtClean="0"/>
-              <a:t>11/3/2023</a:t>
+              <a:t>11/7/2023</a:t>
             </a:fld>
             <a:endParaRPr lang="en-US"/>
           </a:p>
@@ -3117,7 +3117,7 @@
           <a:p>
             <a:fld id="{8C792E63-5F21-4F54-A864-D84D9F273FCA}" type="datetimeFigureOut">
               <a:rPr lang="en-US" smtClean="0"/>
-              <a:t>11/3/2023</a:t>
+              <a:t>11/7/2023</a:t>
             </a:fld>
             <a:endParaRPr lang="en-US"/>
           </a:p>
@@ -3246,7 +3246,7 @@
           <a:p>
             <a:fld id="{8C792E63-5F21-4F54-A864-D84D9F273FCA}" type="datetimeFigureOut">
               <a:rPr lang="en-US" smtClean="0"/>
-              <a:t>11/3/2023</a:t>
+              <a:t>11/7/2023</a:t>
             </a:fld>
             <a:endParaRPr lang="en-US"/>
           </a:p>
@@ -3573,7 +3573,7 @@
           <a:p>
             <a:fld id="{8C792E63-5F21-4F54-A864-D84D9F273FCA}" type="datetimeFigureOut">
               <a:rPr lang="en-US" smtClean="0"/>
-              <a:t>11/3/2023</a:t>
+              <a:t>11/7/2023</a:t>
             </a:fld>
             <a:endParaRPr lang="en-US"/>
           </a:p>
@@ -3877,7 +3877,7 @@
           <a:p>
             <a:fld id="{8C792E63-5F21-4F54-A864-D84D9F273FCA}" type="datetimeFigureOut">
               <a:rPr lang="en-US" smtClean="0"/>
-              <a:t>11/3/2023</a:t>
+              <a:t>11/7/2023</a:t>
             </a:fld>
             <a:endParaRPr lang="en-US"/>
           </a:p>
@@ -4169,7 +4169,7 @@
           <a:p>
             <a:fld id="{8C792E63-5F21-4F54-A864-D84D9F273FCA}" type="datetimeFigureOut">
               <a:rPr lang="en-US" smtClean="0"/>
-              <a:t>11/3/2023</a:t>
+              <a:t>11/7/2023</a:t>
             </a:fld>
             <a:endParaRPr lang="en-US"/>
           </a:p>
@@ -5144,7 +5144,7 @@
             <a:fld id="{8C792E63-5F21-4F54-A864-D84D9F273FCA}" type="datetimeFigureOut">
               <a:rPr lang="en-US" smtClean="0"/>
               <a:pPr/>
-              <a:t>11/3/2023</a:t>
+              <a:t>11/7/2023</a:t>
             </a:fld>
             <a:endParaRPr lang="en-US" dirty="0"/>
           </a:p>
@@ -5737,7 +5737,7 @@
             <a:fld id="{8C792E63-5F21-4F54-A864-D84D9F273FCA}" type="datetimeFigureOut">
               <a:rPr lang="en-US" smtClean="0"/>
               <a:pPr/>
-              <a:t>11/3/2023</a:t>
+              <a:t>11/7/2023</a:t>
             </a:fld>
             <a:endParaRPr lang="en-US" dirty="0"/>
           </a:p>
@@ -5853,7 +5853,19 @@
               <a:rPr lang="en-US" sz="2400" dirty="0">
                 <a:sym typeface="Wingdings" panose="05000000000000000000" pitchFamily="2" charset="2"/>
               </a:rPr>
-              <a:t>Discovery of pledges by a registrar-agent described in two ways:</a:t>
+              <a:t>Discovery of pledges by a registrar-agent using DNS-SD with </a:t>
+            </a:r>
+            <a:r>
+              <a:rPr lang="en-US" sz="2400" dirty="0" err="1">
+                <a:sym typeface="Wingdings" panose="05000000000000000000" pitchFamily="2" charset="2"/>
+              </a:rPr>
+              <a:t>mDNS</a:t>
+            </a:r>
+            <a:r>
+              <a:rPr lang="en-US" sz="2400" dirty="0">
+                <a:sym typeface="Wingdings" panose="05000000000000000000" pitchFamily="2" charset="2"/>
+              </a:rPr>
+              <a:t> in two ways:</a:t>
             </a:r>
           </a:p>
           <a:p>
@@ -5931,7 +5943,7 @@
               <a:rPr lang="en-US" sz="2400" dirty="0">
                 <a:sym typeface="Wingdings" panose="05000000000000000000" pitchFamily="2" charset="2"/>
               </a:rPr>
-              <a:t> describes more versatile approach to contain additional info (e.g., manufacturer) to product serial number. </a:t>
+              <a:t> describes more versatile approach to contain additional info (e.g., manufacturer) to product serial number but also to used, e.g., GRASP. </a:t>
             </a:r>
           </a:p>
           <a:p>
@@ -5975,8 +5987,56 @@
                 <a:ea typeface="Calibri" panose="020F0502020204030204" pitchFamily="34" charset="0"/>
                 <a:cs typeface="Arial" panose="020B0604020202020204" pitchFamily="34" charset="0"/>
               </a:rPr>
-              <a:t>by using manufacturer-specific product serial numbers only.  </a:t>
-            </a:r>
+              <a:t>by using manufacturer-specific product serial numbers and DNS-SD with </a:t>
+            </a:r>
+            <a:r>
+              <a:rPr lang="en-US" sz="2400" kern="100" dirty="0" err="1">
+                <a:effectLst/>
+                <a:latin typeface="Calibri" panose="020F0502020204030204" pitchFamily="34" charset="0"/>
+                <a:ea typeface="Calibri" panose="020F0502020204030204" pitchFamily="34" charset="0"/>
+                <a:cs typeface="Arial" panose="020B0604020202020204" pitchFamily="34" charset="0"/>
+              </a:rPr>
+              <a:t>mDNS</a:t>
+            </a:r>
+            <a:r>
+              <a:rPr lang="en-US" sz="2400" kern="100" dirty="0">
+                <a:effectLst/>
+                <a:latin typeface="Calibri" panose="020F0502020204030204" pitchFamily="34" charset="0"/>
+                <a:ea typeface="Calibri" panose="020F0502020204030204" pitchFamily="34" charset="0"/>
+                <a:cs typeface="Arial" panose="020B0604020202020204" pitchFamily="34" charset="0"/>
+              </a:rPr>
+              <a:t> as minimal solution</a:t>
+            </a:r>
+            <a:r>
+              <a:rPr lang="en-US" sz="2400" kern="100" dirty="0">
+                <a:latin typeface="Calibri" panose="020F0502020204030204" pitchFamily="34" charset="0"/>
+                <a:ea typeface="Calibri" panose="020F0502020204030204" pitchFamily="34" charset="0"/>
+                <a:cs typeface="Arial" panose="020B0604020202020204" pitchFamily="34" charset="0"/>
+              </a:rPr>
+              <a:t> to be supported and to refer </a:t>
+            </a:r>
+            <a:r>
+              <a:rPr lang="en-US" sz="2400" kern="100">
+                <a:latin typeface="Calibri" panose="020F0502020204030204" pitchFamily="34" charset="0"/>
+                <a:ea typeface="Calibri" panose="020F0502020204030204" pitchFamily="34" charset="0"/>
+                <a:cs typeface="Arial" panose="020B0604020202020204" pitchFamily="34" charset="0"/>
+              </a:rPr>
+              <a:t>to BRSKI-Discovery </a:t>
+            </a:r>
+            <a:r>
+              <a:rPr lang="en-US" sz="2400" kern="100" dirty="0">
+                <a:latin typeface="Calibri" panose="020F0502020204030204" pitchFamily="34" charset="0"/>
+                <a:ea typeface="Calibri" panose="020F0502020204030204" pitchFamily="34" charset="0"/>
+                <a:cs typeface="Arial" panose="020B0604020202020204" pitchFamily="34" charset="0"/>
+              </a:rPr>
+              <a:t>for enhanced discovery.</a:t>
+            </a:r>
+            <a:endParaRPr lang="en-US" sz="2400" kern="100" dirty="0">
+              <a:effectLst/>
+              <a:latin typeface="Calibri" panose="020F0502020204030204" pitchFamily="34" charset="0"/>
+              <a:ea typeface="Calibri" panose="020F0502020204030204" pitchFamily="34" charset="0"/>
+              <a:cs typeface="Arial" panose="020B0604020202020204" pitchFamily="34" charset="0"/>
+            </a:endParaRPr>
           </a:p>
           <a:p>
             <a:pPr lvl="1">
@@ -5984,15 +6044,7 @@
             </a:pPr>
             <a:r>
               <a:rPr lang="en-US" sz="2000" dirty="0"/>
-              <a:t>Note: May result in false positives (many manufacturer likely </a:t>
-            </a:r>
-            <a:r>
-              <a:rPr lang="en-US" sz="2000"/>
-              <a:t>have serial </a:t>
-            </a:r>
-            <a:r>
-              <a:rPr lang="en-US" sz="2000" dirty="0"/>
-              <a:t>number 001), the registrar-agent can filter through the results, e.g., based on the related </a:t>
+              <a:t>Note: May result in false positives (many manufacturer likely have serial number 001), the registrar-agent can filter through the results, e.g., based on the related </a:t>
             </a:r>
             <a:r>
               <a:rPr lang="en-US" sz="2000" dirty="0" err="1"/>
@@ -6266,7 +6318,7 @@
             <a:fld id="{8C792E63-5F21-4F54-A864-D84D9F273FCA}" type="datetimeFigureOut">
               <a:rPr lang="en-US" smtClean="0"/>
               <a:pPr/>
-              <a:t>11/3/2023</a:t>
+              <a:t>11/7/2023</a:t>
             </a:fld>
             <a:endParaRPr lang="en-US" dirty="0"/>
           </a:p>
@@ -6820,7 +6872,7 @@
             <a:fld id="{8C792E63-5F21-4F54-A864-D84D9F273FCA}" type="datetimeFigureOut">
               <a:rPr lang="en-US" smtClean="0"/>
               <a:pPr/>
-              <a:t>11/3/2023</a:t>
+              <a:t>11/7/2023</a:t>
             </a:fld>
             <a:endParaRPr lang="en-US" dirty="0"/>
           </a:p>

</xml_diff>